<commit_message>
Variable selection and basic parsing
</commit_message>
<xml_diff>
--- a/mockup.pptx
+++ b/mockup.pptx
@@ -6,6 +6,7 @@
   </p:sldMasterIdLst>
   <p:sldIdLst>
     <p:sldId id="256" r:id="rId2"/>
+    <p:sldId id="257" r:id="rId3"/>
   </p:sldIdLst>
   <p:sldSz cx="12192000" cy="6858000"/>
   <p:notesSz cx="6858000" cy="9144000"/>
@@ -104,6 +105,11 @@
       </a:defRPr>
     </a:lvl9pPr>
   </p:defaultTextStyle>
+  <p:extLst>
+    <p:ext uri="{EFAFB233-063F-42B5-8137-9DF3F51BA10A}">
+      <p15:sldGuideLst xmlns:p15="http://schemas.microsoft.com/office/powerpoint/2012/main"/>
+    </p:ext>
+  </p:extLst>
 </p:presentation>
 </file>
 
@@ -254,7 +260,7 @@
           <a:p>
             <a:fld id="{5F1AE390-CF33-4EE6-9570-6C65B956D904}" type="datetimeFigureOut">
               <a:rPr lang="en-US" smtClean="0"/>
-              <a:t>7/25/2025</a:t>
+              <a:t>8/13/2025</a:t>
             </a:fld>
             <a:endParaRPr lang="en-US"/>
           </a:p>
@@ -452,7 +458,7 @@
           <a:p>
             <a:fld id="{5F1AE390-CF33-4EE6-9570-6C65B956D904}" type="datetimeFigureOut">
               <a:rPr lang="en-US" smtClean="0"/>
-              <a:t>7/25/2025</a:t>
+              <a:t>8/13/2025</a:t>
             </a:fld>
             <a:endParaRPr lang="en-US"/>
           </a:p>
@@ -660,7 +666,7 @@
           <a:p>
             <a:fld id="{5F1AE390-CF33-4EE6-9570-6C65B956D904}" type="datetimeFigureOut">
               <a:rPr lang="en-US" smtClean="0"/>
-              <a:t>7/25/2025</a:t>
+              <a:t>8/13/2025</a:t>
             </a:fld>
             <a:endParaRPr lang="en-US"/>
           </a:p>
@@ -858,7 +864,7 @@
           <a:p>
             <a:fld id="{5F1AE390-CF33-4EE6-9570-6C65B956D904}" type="datetimeFigureOut">
               <a:rPr lang="en-US" smtClean="0"/>
-              <a:t>7/25/2025</a:t>
+              <a:t>8/13/2025</a:t>
             </a:fld>
             <a:endParaRPr lang="en-US"/>
           </a:p>
@@ -1133,7 +1139,7 @@
           <a:p>
             <a:fld id="{5F1AE390-CF33-4EE6-9570-6C65B956D904}" type="datetimeFigureOut">
               <a:rPr lang="en-US" smtClean="0"/>
-              <a:t>7/25/2025</a:t>
+              <a:t>8/13/2025</a:t>
             </a:fld>
             <a:endParaRPr lang="en-US"/>
           </a:p>
@@ -1398,7 +1404,7 @@
           <a:p>
             <a:fld id="{5F1AE390-CF33-4EE6-9570-6C65B956D904}" type="datetimeFigureOut">
               <a:rPr lang="en-US" smtClean="0"/>
-              <a:t>7/25/2025</a:t>
+              <a:t>8/13/2025</a:t>
             </a:fld>
             <a:endParaRPr lang="en-US"/>
           </a:p>
@@ -1810,7 +1816,7 @@
           <a:p>
             <a:fld id="{5F1AE390-CF33-4EE6-9570-6C65B956D904}" type="datetimeFigureOut">
               <a:rPr lang="en-US" smtClean="0"/>
-              <a:t>7/25/2025</a:t>
+              <a:t>8/13/2025</a:t>
             </a:fld>
             <a:endParaRPr lang="en-US"/>
           </a:p>
@@ -1951,7 +1957,7 @@
           <a:p>
             <a:fld id="{5F1AE390-CF33-4EE6-9570-6C65B956D904}" type="datetimeFigureOut">
               <a:rPr lang="en-US" smtClean="0"/>
-              <a:t>7/25/2025</a:t>
+              <a:t>8/13/2025</a:t>
             </a:fld>
             <a:endParaRPr lang="en-US"/>
           </a:p>
@@ -2064,7 +2070,7 @@
           <a:p>
             <a:fld id="{5F1AE390-CF33-4EE6-9570-6C65B956D904}" type="datetimeFigureOut">
               <a:rPr lang="en-US" smtClean="0"/>
-              <a:t>7/25/2025</a:t>
+              <a:t>8/13/2025</a:t>
             </a:fld>
             <a:endParaRPr lang="en-US"/>
           </a:p>
@@ -2375,7 +2381,7 @@
           <a:p>
             <a:fld id="{5F1AE390-CF33-4EE6-9570-6C65B956D904}" type="datetimeFigureOut">
               <a:rPr lang="en-US" smtClean="0"/>
-              <a:t>7/25/2025</a:t>
+              <a:t>8/13/2025</a:t>
             </a:fld>
             <a:endParaRPr lang="en-US"/>
           </a:p>
@@ -2663,7 +2669,7 @@
           <a:p>
             <a:fld id="{5F1AE390-CF33-4EE6-9570-6C65B956D904}" type="datetimeFigureOut">
               <a:rPr lang="en-US" smtClean="0"/>
-              <a:t>7/25/2025</a:t>
+              <a:t>8/13/2025</a:t>
             </a:fld>
             <a:endParaRPr lang="en-US"/>
           </a:p>
@@ -2904,7 +2910,7 @@
           <a:p>
             <a:fld id="{5F1AE390-CF33-4EE6-9570-6C65B956D904}" type="datetimeFigureOut">
               <a:rPr lang="en-US" smtClean="0"/>
-              <a:t>7/25/2025</a:t>
+              <a:t>8/13/2025</a:t>
             </a:fld>
             <a:endParaRPr lang="en-US"/>
           </a:p>
@@ -4664,6 +4670,35 @@
           </a:p>
         </p:txBody>
       </p:sp>
+      <p:pic>
+        <p:nvPicPr>
+          <p:cNvPr id="2" name="Picture 1">
+            <a:extLst>
+              <a:ext uri="{FF2B5EF4-FFF2-40B4-BE49-F238E27FC236}">
+                <a16:creationId xmlns:a16="http://schemas.microsoft.com/office/drawing/2014/main" id="{E8C5F1AF-2E23-5E66-C190-5A033DA0AA93}"/>
+              </a:ext>
+            </a:extLst>
+          </p:cNvPr>
+          <p:cNvPicPr>
+            <a:picLocks noChangeAspect="1"/>
+          </p:cNvPicPr>
+          <p:nvPr/>
+        </p:nvPicPr>
+        <p:blipFill rotWithShape="1">
+          <a:blip r:embed="rId4"/>
+          <a:srcRect l="778" t="13440" r="1534" b="6355"/>
+          <a:stretch/>
+        </p:blipFill>
+        <p:spPr>
+          <a:xfrm>
+            <a:off x="9075889" y="3600263"/>
+            <a:ext cx="438134" cy="307777"/>
+          </a:xfrm>
+          <a:prstGeom prst="rect">
+            <a:avLst/>
+          </a:prstGeom>
+        </p:spPr>
+      </p:pic>
     </p:spTree>
     <p:extLst>
       <p:ext uri="{BB962C8B-B14F-4D97-AF65-F5344CB8AC3E}">
@@ -4675,6 +4710,1580 @@
     <a:masterClrMapping/>
   </p:clrMapOvr>
 </p:sld>
+</file>
+
+<file path=ppt/slides/slide2.xml><?xml version="1.0" encoding="utf-8"?>
+<p:sld xmlns:a="http://schemas.openxmlformats.org/drawingml/2006/main" xmlns:r="http://schemas.openxmlformats.org/officeDocument/2006/relationships" xmlns:p="http://schemas.openxmlformats.org/presentationml/2006/main">
+  <p:cSld>
+    <p:spTree>
+      <p:nvGrpSpPr>
+        <p:cNvPr id="1" name=""/>
+        <p:cNvGrpSpPr/>
+        <p:nvPr/>
+      </p:nvGrpSpPr>
+      <p:grpSpPr>
+        <a:xfrm>
+          <a:off x="0" y="0"/>
+          <a:ext cx="0" cy="0"/>
+          <a:chOff x="0" y="0"/>
+          <a:chExt cx="0" cy="0"/>
+        </a:xfrm>
+      </p:grpSpPr>
+      <p:pic>
+        <p:nvPicPr>
+          <p:cNvPr id="7" name="Picture 6">
+            <a:extLst>
+              <a:ext uri="{FF2B5EF4-FFF2-40B4-BE49-F238E27FC236}">
+                <a16:creationId xmlns:a16="http://schemas.microsoft.com/office/drawing/2014/main" id="{84D068A9-2207-A9F9-8D49-B940A1429F1F}"/>
+              </a:ext>
+            </a:extLst>
+          </p:cNvPr>
+          <p:cNvPicPr>
+            <a:picLocks noGrp="1" noRot="1" noChangeAspect="1" noMove="1" noResize="1" noEditPoints="1" noAdjustHandles="1" noChangeArrowheads="1" noChangeShapeType="1" noCrop="1"/>
+          </p:cNvPicPr>
+          <p:nvPr/>
+        </p:nvPicPr>
+        <p:blipFill>
+          <a:blip r:embed="rId4"/>
+          <a:stretch>
+            <a:fillRect/>
+          </a:stretch>
+        </p:blipFill>
+        <p:spPr>
+          <a:xfrm>
+            <a:off x="0" y="1668"/>
+            <a:ext cx="12192000" cy="6854664"/>
+          </a:xfrm>
+          <a:prstGeom prst="rect">
+            <a:avLst/>
+          </a:prstGeom>
+        </p:spPr>
+      </p:pic>
+      <p:sp>
+        <p:nvSpPr>
+          <p:cNvPr id="42" name="Rectangle 41">
+            <a:extLst>
+              <a:ext uri="{FF2B5EF4-FFF2-40B4-BE49-F238E27FC236}">
+                <a16:creationId xmlns:a16="http://schemas.microsoft.com/office/drawing/2014/main" id="{995346E4-9DB7-6F27-4B14-C58A4FDC8B7B}"/>
+              </a:ext>
+            </a:extLst>
+          </p:cNvPr>
+          <p:cNvSpPr>
+            <a:spLocks noGrp="1" noRot="1" noMove="1" noResize="1" noEditPoints="1" noAdjustHandles="1" noChangeArrowheads="1" noChangeShapeType="1"/>
+          </p:cNvSpPr>
+          <p:nvPr/>
+        </p:nvSpPr>
+        <p:spPr>
+          <a:xfrm>
+            <a:off x="0" y="655321"/>
+            <a:ext cx="12192000" cy="5844539"/>
+          </a:xfrm>
+          <a:prstGeom prst="rect">
+            <a:avLst/>
+          </a:prstGeom>
+          <a:solidFill>
+            <a:srgbClr val="F5F5F5"/>
+          </a:solidFill>
+          <a:ln>
+            <a:noFill/>
+          </a:ln>
+        </p:spPr>
+        <p:style>
+          <a:lnRef idx="2">
+            <a:schemeClr val="accent1">
+              <a:shade val="15000"/>
+            </a:schemeClr>
+          </a:lnRef>
+          <a:fillRef idx="1">
+            <a:schemeClr val="accent1"/>
+          </a:fillRef>
+          <a:effectRef idx="0">
+            <a:schemeClr val="accent1"/>
+          </a:effectRef>
+          <a:fontRef idx="minor">
+            <a:schemeClr val="lt1"/>
+          </a:fontRef>
+        </p:style>
+        <p:txBody>
+          <a:bodyPr rtlCol="0" anchor="ctr"/>
+          <a:lstStyle/>
+          <a:p>
+            <a:pPr algn="ctr"/>
+            <a:endParaRPr lang="en-US" dirty="0">
+              <a:solidFill>
+                <a:srgbClr val="F5F5F5"/>
+              </a:solidFill>
+            </a:endParaRPr>
+          </a:p>
+        </p:txBody>
+      </p:sp>
+      <p:sp>
+        <p:nvSpPr>
+          <p:cNvPr id="25" name="TextBox 24">
+            <a:extLst>
+              <a:ext uri="{FF2B5EF4-FFF2-40B4-BE49-F238E27FC236}">
+                <a16:creationId xmlns:a16="http://schemas.microsoft.com/office/drawing/2014/main" id="{D79B0843-B01E-CCE2-6E03-916F65EC8682}"/>
+              </a:ext>
+            </a:extLst>
+          </p:cNvPr>
+          <p:cNvSpPr txBox="1"/>
+          <p:nvPr/>
+        </p:nvSpPr>
+        <p:spPr>
+          <a:xfrm>
+            <a:off x="4227800" y="2460676"/>
+            <a:ext cx="2014219" cy="307777"/>
+          </a:xfrm>
+          <a:prstGeom prst="rect">
+            <a:avLst/>
+          </a:prstGeom>
+          <a:noFill/>
+        </p:spPr>
+        <p:txBody>
+          <a:bodyPr wrap="square" rtlCol="0">
+            <a:spAutoFit/>
+          </a:bodyPr>
+          <a:lstStyle/>
+          <a:p>
+            <a:r>
+              <a:rPr lang="en-US" sz="1400" dirty="0">
+                <a:solidFill>
+                  <a:schemeClr val="bg2">
+                    <a:lumMod val="50000"/>
+                  </a:schemeClr>
+                </a:solidFill>
+                <a:latin typeface="Georgia" panose="02040502050405020303" pitchFamily="18" charset="0"/>
+              </a:rPr>
+              <a:t>Type an expression:</a:t>
+            </a:r>
+          </a:p>
+        </p:txBody>
+      </p:sp>
+      <p:sp>
+        <p:nvSpPr>
+          <p:cNvPr id="21" name="TextBox 20">
+            <a:extLst>
+              <a:ext uri="{FF2B5EF4-FFF2-40B4-BE49-F238E27FC236}">
+                <a16:creationId xmlns:a16="http://schemas.microsoft.com/office/drawing/2014/main" id="{239B2BA9-B9FD-BD3A-B017-509BDEE0C287}"/>
+              </a:ext>
+            </a:extLst>
+          </p:cNvPr>
+          <p:cNvSpPr txBox="1"/>
+          <p:nvPr/>
+        </p:nvSpPr>
+        <p:spPr>
+          <a:xfrm>
+            <a:off x="2299333" y="1182969"/>
+            <a:ext cx="7593334" cy="646331"/>
+          </a:xfrm>
+          <a:prstGeom prst="rect">
+            <a:avLst/>
+          </a:prstGeom>
+          <a:noFill/>
+        </p:spPr>
+        <p:txBody>
+          <a:bodyPr wrap="square" rtlCol="0">
+            <a:spAutoFit/>
+          </a:bodyPr>
+          <a:lstStyle/>
+          <a:p>
+            <a:pPr algn="ctr"/>
+            <a:r>
+              <a:rPr lang="en-US" sz="3600" dirty="0">
+                <a:latin typeface="Georgia" panose="02040502050405020303" pitchFamily="18" charset="0"/>
+                <a:cs typeface="Times New Roman" panose="02020603050405020304" pitchFamily="18" charset="0"/>
+              </a:rPr>
+              <a:t>Integral/Derivative Calculator</a:t>
+            </a:r>
+          </a:p>
+        </p:txBody>
+      </p:sp>
+      <p:pic>
+        <p:nvPicPr>
+          <p:cNvPr id="23" name="Picture 22" descr="A black letter on a white background&#10;&#10;Description automatically generated">
+            <a:extLst>
+              <a:ext uri="{FF2B5EF4-FFF2-40B4-BE49-F238E27FC236}">
+                <a16:creationId xmlns:a16="http://schemas.microsoft.com/office/drawing/2014/main" id="{6B36A717-8111-0FD6-93ED-EBB16C237EE2}"/>
+              </a:ext>
+            </a:extLst>
+          </p:cNvPr>
+          <p:cNvPicPr>
+            <a:picLocks noChangeAspect="1"/>
+          </p:cNvPicPr>
+          <p:nvPr/>
+        </p:nvPicPr>
+        <p:blipFill>
+          <a:blip r:embed="rId5">
+            <a:extLst>
+              <a:ext uri="{28A0092B-C50C-407E-A947-70E740481C1C}">
+                <a14:useLocalDpi xmlns:a14="http://schemas.microsoft.com/office/drawing/2010/main" val="0"/>
+              </a:ext>
+            </a:extLst>
+          </a:blip>
+          <a:stretch>
+            <a:fillRect/>
+          </a:stretch>
+        </p:blipFill>
+        <p:spPr>
+          <a:xfrm>
+            <a:off x="143601" y="82756"/>
+            <a:ext cx="163826" cy="163826"/>
+          </a:xfrm>
+          <a:prstGeom prst="rect">
+            <a:avLst/>
+          </a:prstGeom>
+        </p:spPr>
+      </p:pic>
+      <p:sp>
+        <p:nvSpPr>
+          <p:cNvPr id="27" name="Rectangle: Rounded Corners 26">
+            <a:extLst>
+              <a:ext uri="{FF2B5EF4-FFF2-40B4-BE49-F238E27FC236}">
+                <a16:creationId xmlns:a16="http://schemas.microsoft.com/office/drawing/2014/main" id="{DFB94C1C-0DB5-7F9F-88CB-8F5585C4DC1C}"/>
+              </a:ext>
+            </a:extLst>
+          </p:cNvPr>
+          <p:cNvSpPr/>
+          <p:nvPr/>
+        </p:nvSpPr>
+        <p:spPr>
+          <a:xfrm>
+            <a:off x="5215730" y="4027011"/>
+            <a:ext cx="1760537" cy="243939"/>
+          </a:xfrm>
+          <a:prstGeom prst="roundRect">
+            <a:avLst/>
+          </a:prstGeom>
+          <a:gradFill>
+            <a:gsLst>
+              <a:gs pos="0">
+                <a:schemeClr val="bg1"/>
+              </a:gs>
+              <a:gs pos="45000">
+                <a:schemeClr val="bg1"/>
+              </a:gs>
+              <a:gs pos="100000">
+                <a:schemeClr val="bg2"/>
+              </a:gs>
+            </a:gsLst>
+            <a:lin ang="5400000" scaled="1"/>
+          </a:gradFill>
+          <a:ln w="3175">
+            <a:solidFill>
+              <a:schemeClr val="tx1"/>
+            </a:solidFill>
+          </a:ln>
+        </p:spPr>
+        <p:style>
+          <a:lnRef idx="2">
+            <a:schemeClr val="accent1">
+              <a:shade val="15000"/>
+            </a:schemeClr>
+          </a:lnRef>
+          <a:fillRef idx="1">
+            <a:schemeClr val="accent1"/>
+          </a:fillRef>
+          <a:effectRef idx="0">
+            <a:schemeClr val="accent1"/>
+          </a:effectRef>
+          <a:fontRef idx="minor">
+            <a:schemeClr val="lt1"/>
+          </a:fontRef>
+        </p:style>
+        <p:txBody>
+          <a:bodyPr rtlCol="0" anchor="ctr"/>
+          <a:lstStyle/>
+          <a:p>
+            <a:pPr algn="ctr"/>
+            <a:r>
+              <a:rPr lang="en-US" sz="1400" dirty="0">
+                <a:solidFill>
+                  <a:schemeClr val="bg2">
+                    <a:lumMod val="25000"/>
+                  </a:schemeClr>
+                </a:solidFill>
+              </a:rPr>
+              <a:t>Find Antiderivative</a:t>
+            </a:r>
+          </a:p>
+        </p:txBody>
+      </p:sp>
+      <p:pic>
+        <p:nvPicPr>
+          <p:cNvPr id="29" name="Picture 28">
+            <a:extLst>
+              <a:ext uri="{FF2B5EF4-FFF2-40B4-BE49-F238E27FC236}">
+                <a16:creationId xmlns:a16="http://schemas.microsoft.com/office/drawing/2014/main" id="{D7CEAB83-D7A0-40B4-3735-62AEF22D2581}"/>
+              </a:ext>
+            </a:extLst>
+          </p:cNvPr>
+          <p:cNvPicPr>
+            <a:picLocks noChangeAspect="1"/>
+          </p:cNvPicPr>
+          <p:nvPr/>
+        </p:nvPicPr>
+        <p:blipFill rotWithShape="1">
+          <a:blip r:embed="rId6"/>
+          <a:srcRect l="778" t="13440" r="1534" b="6355"/>
+          <a:stretch/>
+        </p:blipFill>
+        <p:spPr>
+          <a:xfrm>
+            <a:off x="4736866" y="2883331"/>
+            <a:ext cx="2768834" cy="484001"/>
+          </a:xfrm>
+          <a:prstGeom prst="rect">
+            <a:avLst/>
+          </a:prstGeom>
+        </p:spPr>
+      </p:pic>
+      <p:sp>
+        <p:nvSpPr>
+          <p:cNvPr id="13" name="Rectangle 12">
+            <a:extLst>
+              <a:ext uri="{FF2B5EF4-FFF2-40B4-BE49-F238E27FC236}">
+                <a16:creationId xmlns:a16="http://schemas.microsoft.com/office/drawing/2014/main" id="{C581485F-160F-0E04-C4FC-0B3E4B83675E}"/>
+              </a:ext>
+            </a:extLst>
+          </p:cNvPr>
+          <p:cNvSpPr/>
+          <p:nvPr/>
+        </p:nvSpPr>
+        <p:spPr>
+          <a:xfrm>
+            <a:off x="4186635" y="776485"/>
+            <a:ext cx="2372864" cy="311463"/>
+          </a:xfrm>
+          <a:prstGeom prst="rect">
+            <a:avLst/>
+          </a:prstGeom>
+          <a:solidFill>
+            <a:schemeClr val="bg1"/>
+          </a:solidFill>
+        </p:spPr>
+        <p:style>
+          <a:lnRef idx="2">
+            <a:schemeClr val="accent1">
+              <a:shade val="15000"/>
+            </a:schemeClr>
+          </a:lnRef>
+          <a:fillRef idx="1">
+            <a:schemeClr val="accent1"/>
+          </a:fillRef>
+          <a:effectRef idx="0">
+            <a:schemeClr val="accent1"/>
+          </a:effectRef>
+          <a:fontRef idx="minor">
+            <a:schemeClr val="lt1"/>
+          </a:fontRef>
+        </p:style>
+        <p:txBody>
+          <a:bodyPr rtlCol="0" anchor="ctr"/>
+          <a:lstStyle/>
+          <a:p>
+            <a:pPr algn="ctr"/>
+            <a:r>
+              <a:rPr lang="en-US" sz="1200" dirty="0">
+                <a:solidFill>
+                  <a:schemeClr val="tx1"/>
+                </a:solidFill>
+                <a:latin typeface="Georgia" panose="02040502050405020303" pitchFamily="18" charset="0"/>
+                <a:cs typeface="Times New Roman" panose="02020603050405020304" pitchFamily="18" charset="0"/>
+              </a:rPr>
+              <a:t>Integral/Derivative Calculator</a:t>
+            </a:r>
+          </a:p>
+        </p:txBody>
+      </p:sp>
+      <p:sp>
+        <p:nvSpPr>
+          <p:cNvPr id="14" name="Rectangle 13">
+            <a:extLst>
+              <a:ext uri="{FF2B5EF4-FFF2-40B4-BE49-F238E27FC236}">
+                <a16:creationId xmlns:a16="http://schemas.microsoft.com/office/drawing/2014/main" id="{14A5E7BD-36B5-CFA3-9EF0-C9ACA0933B8E}"/>
+              </a:ext>
+            </a:extLst>
+          </p:cNvPr>
+          <p:cNvSpPr/>
+          <p:nvPr/>
+        </p:nvSpPr>
+        <p:spPr>
+          <a:xfrm>
+            <a:off x="2355175" y="771473"/>
+            <a:ext cx="1831460" cy="311463"/>
+          </a:xfrm>
+          <a:prstGeom prst="rect">
+            <a:avLst/>
+          </a:prstGeom>
+          <a:solidFill>
+            <a:schemeClr val="tx1"/>
+          </a:solidFill>
+        </p:spPr>
+        <p:style>
+          <a:lnRef idx="2">
+            <a:schemeClr val="accent1">
+              <a:shade val="15000"/>
+            </a:schemeClr>
+          </a:lnRef>
+          <a:fillRef idx="1">
+            <a:schemeClr val="accent1"/>
+          </a:fillRef>
+          <a:effectRef idx="0">
+            <a:schemeClr val="accent1"/>
+          </a:effectRef>
+          <a:fontRef idx="minor">
+            <a:schemeClr val="lt1"/>
+          </a:fontRef>
+        </p:style>
+        <p:txBody>
+          <a:bodyPr rtlCol="0" anchor="ctr"/>
+          <a:lstStyle/>
+          <a:p>
+            <a:pPr algn="ctr"/>
+            <a:r>
+              <a:rPr lang="en-US" sz="1200" dirty="0">
+                <a:solidFill>
+                  <a:schemeClr val="bg1"/>
+                </a:solidFill>
+                <a:latin typeface="Georgia" panose="02040502050405020303" pitchFamily="18" charset="0"/>
+                <a:cs typeface="Times New Roman" panose="02020603050405020304" pitchFamily="18" charset="0"/>
+              </a:rPr>
+              <a:t>Algebraic Solver</a:t>
+            </a:r>
+          </a:p>
+        </p:txBody>
+      </p:sp>
+      <p:sp>
+        <p:nvSpPr>
+          <p:cNvPr id="15" name="Rectangle 14">
+            <a:extLst>
+              <a:ext uri="{FF2B5EF4-FFF2-40B4-BE49-F238E27FC236}">
+                <a16:creationId xmlns:a16="http://schemas.microsoft.com/office/drawing/2014/main" id="{C428D3C7-0BC8-9D50-B56C-49018F037A1C}"/>
+              </a:ext>
+            </a:extLst>
+          </p:cNvPr>
+          <p:cNvSpPr/>
+          <p:nvPr/>
+        </p:nvSpPr>
+        <p:spPr>
+          <a:xfrm>
+            <a:off x="9710392" y="782485"/>
+            <a:ext cx="1010129" cy="311463"/>
+          </a:xfrm>
+          <a:prstGeom prst="rect">
+            <a:avLst/>
+          </a:prstGeom>
+          <a:solidFill>
+            <a:schemeClr val="bg1"/>
+          </a:solidFill>
+        </p:spPr>
+        <p:style>
+          <a:lnRef idx="2">
+            <a:schemeClr val="accent1">
+              <a:shade val="15000"/>
+            </a:schemeClr>
+          </a:lnRef>
+          <a:fillRef idx="1">
+            <a:schemeClr val="accent1"/>
+          </a:fillRef>
+          <a:effectRef idx="0">
+            <a:schemeClr val="accent1"/>
+          </a:effectRef>
+          <a:fontRef idx="minor">
+            <a:schemeClr val="lt1"/>
+          </a:fontRef>
+        </p:style>
+        <p:txBody>
+          <a:bodyPr rtlCol="0" anchor="ctr"/>
+          <a:lstStyle/>
+          <a:p>
+            <a:pPr algn="ctr"/>
+            <a:r>
+              <a:rPr lang="en-US" sz="1200" dirty="0">
+                <a:solidFill>
+                  <a:schemeClr val="tx1"/>
+                </a:solidFill>
+                <a:latin typeface="Georgia" panose="02040502050405020303" pitchFamily="18" charset="0"/>
+                <a:cs typeface="Times New Roman" panose="02020603050405020304" pitchFamily="18" charset="0"/>
+              </a:rPr>
+              <a:t>More ▼</a:t>
+            </a:r>
+          </a:p>
+        </p:txBody>
+      </p:sp>
+      <p:sp>
+        <p:nvSpPr>
+          <p:cNvPr id="19" name="Rectangle 18">
+            <a:extLst>
+              <a:ext uri="{FF2B5EF4-FFF2-40B4-BE49-F238E27FC236}">
+                <a16:creationId xmlns:a16="http://schemas.microsoft.com/office/drawing/2014/main" id="{7E75E512-152C-607C-C54E-E0187AA86265}"/>
+              </a:ext>
+            </a:extLst>
+          </p:cNvPr>
+          <p:cNvSpPr/>
+          <p:nvPr/>
+        </p:nvSpPr>
+        <p:spPr>
+          <a:xfrm>
+            <a:off x="1460326" y="771472"/>
+            <a:ext cx="894849" cy="311463"/>
+          </a:xfrm>
+          <a:prstGeom prst="rect">
+            <a:avLst/>
+          </a:prstGeom>
+          <a:solidFill>
+            <a:schemeClr val="bg1"/>
+          </a:solidFill>
+        </p:spPr>
+        <p:style>
+          <a:lnRef idx="2">
+            <a:schemeClr val="accent1">
+              <a:shade val="15000"/>
+            </a:schemeClr>
+          </a:lnRef>
+          <a:fillRef idx="1">
+            <a:schemeClr val="accent1"/>
+          </a:fillRef>
+          <a:effectRef idx="0">
+            <a:schemeClr val="accent1"/>
+          </a:effectRef>
+          <a:fontRef idx="minor">
+            <a:schemeClr val="lt1"/>
+          </a:fontRef>
+        </p:style>
+        <p:txBody>
+          <a:bodyPr rtlCol="0" anchor="ctr"/>
+          <a:lstStyle/>
+          <a:p>
+            <a:pPr algn="ctr"/>
+            <a:r>
+              <a:rPr lang="en-US" sz="1200" dirty="0">
+                <a:solidFill>
+                  <a:schemeClr val="tx1"/>
+                </a:solidFill>
+                <a:latin typeface="Georgia" panose="02040502050405020303" pitchFamily="18" charset="0"/>
+                <a:cs typeface="Times New Roman" panose="02020603050405020304" pitchFamily="18" charset="0"/>
+              </a:rPr>
+              <a:t>Home</a:t>
+            </a:r>
+          </a:p>
+        </p:txBody>
+      </p:sp>
+      <p:sp>
+        <p:nvSpPr>
+          <p:cNvPr id="33" name="Rectangle 32">
+            <a:extLst>
+              <a:ext uri="{FF2B5EF4-FFF2-40B4-BE49-F238E27FC236}">
+                <a16:creationId xmlns:a16="http://schemas.microsoft.com/office/drawing/2014/main" id="{26A98D38-B580-1608-D364-FC61A00113B5}"/>
+              </a:ext>
+            </a:extLst>
+          </p:cNvPr>
+          <p:cNvSpPr/>
+          <p:nvPr/>
+        </p:nvSpPr>
+        <p:spPr>
+          <a:xfrm>
+            <a:off x="6567051" y="775560"/>
+            <a:ext cx="1863184" cy="311463"/>
+          </a:xfrm>
+          <a:prstGeom prst="rect">
+            <a:avLst/>
+          </a:prstGeom>
+          <a:solidFill>
+            <a:schemeClr val="bg1"/>
+          </a:solidFill>
+        </p:spPr>
+        <p:style>
+          <a:lnRef idx="2">
+            <a:schemeClr val="accent1">
+              <a:shade val="15000"/>
+            </a:schemeClr>
+          </a:lnRef>
+          <a:fillRef idx="1">
+            <a:schemeClr val="accent1"/>
+          </a:fillRef>
+          <a:effectRef idx="0">
+            <a:schemeClr val="accent1"/>
+          </a:effectRef>
+          <a:fontRef idx="minor">
+            <a:schemeClr val="lt1"/>
+          </a:fontRef>
+        </p:style>
+        <p:txBody>
+          <a:bodyPr rtlCol="0" anchor="ctr"/>
+          <a:lstStyle/>
+          <a:p>
+            <a:pPr algn="ctr"/>
+            <a:r>
+              <a:rPr lang="en-US" sz="1200" dirty="0">
+                <a:solidFill>
+                  <a:schemeClr val="tx1"/>
+                </a:solidFill>
+                <a:latin typeface="Georgia" panose="02040502050405020303" pitchFamily="18" charset="0"/>
+                <a:cs typeface="Times New Roman" panose="02020603050405020304" pitchFamily="18" charset="0"/>
+              </a:rPr>
+              <a:t>Evaluator (With Units)</a:t>
+            </a:r>
+          </a:p>
+        </p:txBody>
+      </p:sp>
+      <p:sp>
+        <p:nvSpPr>
+          <p:cNvPr id="35" name="Rectangle 34">
+            <a:extLst>
+              <a:ext uri="{FF2B5EF4-FFF2-40B4-BE49-F238E27FC236}">
+                <a16:creationId xmlns:a16="http://schemas.microsoft.com/office/drawing/2014/main" id="{75690DEA-4053-739A-6295-712E0DD0B23B}"/>
+              </a:ext>
+            </a:extLst>
+          </p:cNvPr>
+          <p:cNvSpPr/>
+          <p:nvPr/>
+        </p:nvSpPr>
+        <p:spPr>
+          <a:xfrm>
+            <a:off x="8430235" y="775026"/>
+            <a:ext cx="1291309" cy="311463"/>
+          </a:xfrm>
+          <a:prstGeom prst="rect">
+            <a:avLst/>
+          </a:prstGeom>
+          <a:solidFill>
+            <a:schemeClr val="bg1"/>
+          </a:solidFill>
+        </p:spPr>
+        <p:style>
+          <a:lnRef idx="2">
+            <a:schemeClr val="accent1">
+              <a:shade val="15000"/>
+            </a:schemeClr>
+          </a:lnRef>
+          <a:fillRef idx="1">
+            <a:schemeClr val="accent1"/>
+          </a:fillRef>
+          <a:effectRef idx="0">
+            <a:schemeClr val="accent1"/>
+          </a:effectRef>
+          <a:fontRef idx="minor">
+            <a:schemeClr val="lt1"/>
+          </a:fontRef>
+        </p:style>
+        <p:txBody>
+          <a:bodyPr rtlCol="0" anchor="ctr"/>
+          <a:lstStyle/>
+          <a:p>
+            <a:pPr algn="ctr"/>
+            <a:r>
+              <a:rPr lang="en-US" sz="1200" dirty="0">
+                <a:solidFill>
+                  <a:schemeClr val="tx1"/>
+                </a:solidFill>
+                <a:latin typeface="Georgia" panose="02040502050405020303" pitchFamily="18" charset="0"/>
+                <a:cs typeface="Times New Roman" panose="02020603050405020304" pitchFamily="18" charset="0"/>
+              </a:rPr>
+              <a:t>Code Generator</a:t>
+            </a:r>
+          </a:p>
+        </p:txBody>
+      </p:sp>
+      <p:sp>
+        <p:nvSpPr>
+          <p:cNvPr id="41" name="TextBox 40">
+            <a:extLst>
+              <a:ext uri="{FF2B5EF4-FFF2-40B4-BE49-F238E27FC236}">
+                <a16:creationId xmlns:a16="http://schemas.microsoft.com/office/drawing/2014/main" id="{B114871C-765C-3BDF-0374-3768494806EE}"/>
+              </a:ext>
+            </a:extLst>
+          </p:cNvPr>
+          <p:cNvSpPr txBox="1"/>
+          <p:nvPr/>
+        </p:nvSpPr>
+        <p:spPr>
+          <a:xfrm>
+            <a:off x="5106624" y="4474382"/>
+            <a:ext cx="2270790" cy="461665"/>
+          </a:xfrm>
+          <a:prstGeom prst="rect">
+            <a:avLst/>
+          </a:prstGeom>
+          <a:noFill/>
+        </p:spPr>
+        <p:txBody>
+          <a:bodyPr wrap="square" rtlCol="0">
+            <a:spAutoFit/>
+          </a:bodyPr>
+          <a:lstStyle/>
+          <a:p>
+            <a:pPr algn="ctr"/>
+            <a:r>
+              <a:rPr lang="en-US" sz="2400" dirty="0">
+                <a:latin typeface="Georgia" panose="02040502050405020303" pitchFamily="18" charset="0"/>
+              </a:rPr>
+              <a:t>Solution</a:t>
+            </a:r>
+          </a:p>
+        </p:txBody>
+      </p:sp>
+      <p:sp>
+        <p:nvSpPr>
+          <p:cNvPr id="43" name="Rectangle: Rounded Corners 42">
+            <a:extLst>
+              <a:ext uri="{FF2B5EF4-FFF2-40B4-BE49-F238E27FC236}">
+                <a16:creationId xmlns:a16="http://schemas.microsoft.com/office/drawing/2014/main" id="{B369A5F3-E83C-37B2-C1FD-C4E17738DDF3}"/>
+              </a:ext>
+            </a:extLst>
+          </p:cNvPr>
+          <p:cNvSpPr/>
+          <p:nvPr/>
+        </p:nvSpPr>
+        <p:spPr>
+          <a:xfrm>
+            <a:off x="4186635" y="5650009"/>
+            <a:ext cx="1760537" cy="243939"/>
+          </a:xfrm>
+          <a:prstGeom prst="roundRect">
+            <a:avLst/>
+          </a:prstGeom>
+          <a:gradFill>
+            <a:gsLst>
+              <a:gs pos="0">
+                <a:schemeClr val="bg1"/>
+              </a:gs>
+              <a:gs pos="45000">
+                <a:schemeClr val="bg1"/>
+              </a:gs>
+              <a:gs pos="100000">
+                <a:schemeClr val="bg2"/>
+              </a:gs>
+            </a:gsLst>
+            <a:lin ang="5400000" scaled="1"/>
+          </a:gradFill>
+          <a:ln w="3175">
+            <a:solidFill>
+              <a:schemeClr val="tx1"/>
+            </a:solidFill>
+          </a:ln>
+        </p:spPr>
+        <p:style>
+          <a:lnRef idx="2">
+            <a:schemeClr val="accent1">
+              <a:shade val="15000"/>
+            </a:schemeClr>
+          </a:lnRef>
+          <a:fillRef idx="1">
+            <a:schemeClr val="accent1"/>
+          </a:fillRef>
+          <a:effectRef idx="0">
+            <a:schemeClr val="accent1"/>
+          </a:effectRef>
+          <a:fontRef idx="minor">
+            <a:schemeClr val="lt1"/>
+          </a:fontRef>
+        </p:style>
+        <p:txBody>
+          <a:bodyPr rtlCol="0" anchor="ctr"/>
+          <a:lstStyle/>
+          <a:p>
+            <a:pPr algn="ctr"/>
+            <a:r>
+              <a:rPr lang="en-US" sz="1400" dirty="0">
+                <a:solidFill>
+                  <a:schemeClr val="bg2">
+                    <a:lumMod val="25000"/>
+                  </a:schemeClr>
+                </a:solidFill>
+              </a:rPr>
+              <a:t>Evaluate Solution ↩</a:t>
+            </a:r>
+          </a:p>
+        </p:txBody>
+      </p:sp>
+      <p:sp>
+        <p:nvSpPr>
+          <p:cNvPr id="45" name="Rectangle: Rounded Corners 44">
+            <a:extLst>
+              <a:ext uri="{FF2B5EF4-FFF2-40B4-BE49-F238E27FC236}">
+                <a16:creationId xmlns:a16="http://schemas.microsoft.com/office/drawing/2014/main" id="{B52B215E-3BB3-6D6E-1D28-B4B5EA2ACDE0}"/>
+              </a:ext>
+            </a:extLst>
+          </p:cNvPr>
+          <p:cNvSpPr/>
+          <p:nvPr/>
+        </p:nvSpPr>
+        <p:spPr>
+          <a:xfrm>
+            <a:off x="6159515" y="5650009"/>
+            <a:ext cx="1760537" cy="243939"/>
+          </a:xfrm>
+          <a:prstGeom prst="roundRect">
+            <a:avLst/>
+          </a:prstGeom>
+          <a:gradFill>
+            <a:gsLst>
+              <a:gs pos="0">
+                <a:schemeClr val="bg1"/>
+              </a:gs>
+              <a:gs pos="45000">
+                <a:schemeClr val="bg1"/>
+              </a:gs>
+              <a:gs pos="100000">
+                <a:schemeClr val="bg2"/>
+              </a:gs>
+            </a:gsLst>
+            <a:lin ang="5400000" scaled="1"/>
+          </a:gradFill>
+          <a:ln w="3175">
+            <a:solidFill>
+              <a:schemeClr val="tx1"/>
+            </a:solidFill>
+          </a:ln>
+        </p:spPr>
+        <p:style>
+          <a:lnRef idx="2">
+            <a:schemeClr val="accent1">
+              <a:shade val="15000"/>
+            </a:schemeClr>
+          </a:lnRef>
+          <a:fillRef idx="1">
+            <a:schemeClr val="accent1"/>
+          </a:fillRef>
+          <a:effectRef idx="0">
+            <a:schemeClr val="accent1"/>
+          </a:effectRef>
+          <a:fontRef idx="minor">
+            <a:schemeClr val="lt1"/>
+          </a:fontRef>
+        </p:style>
+        <p:txBody>
+          <a:bodyPr rtlCol="0" anchor="ctr"/>
+          <a:lstStyle/>
+          <a:p>
+            <a:pPr algn="ctr"/>
+            <a:r>
+              <a:rPr lang="en-US" sz="1400" dirty="0">
+                <a:solidFill>
+                  <a:schemeClr val="bg2">
+                    <a:lumMod val="25000"/>
+                  </a:schemeClr>
+                </a:solidFill>
+              </a:rPr>
+              <a:t>Generate Code ↩</a:t>
+            </a:r>
+          </a:p>
+        </p:txBody>
+      </p:sp>
+      <p:sp>
+        <p:nvSpPr>
+          <p:cNvPr id="48" name="Rectangle: Rounded Corners 47">
+            <a:extLst>
+              <a:ext uri="{FF2B5EF4-FFF2-40B4-BE49-F238E27FC236}">
+                <a16:creationId xmlns:a16="http://schemas.microsoft.com/office/drawing/2014/main" id="{E3AE94AA-21F9-0292-AD14-AE8ED00ADF1C}"/>
+              </a:ext>
+            </a:extLst>
+          </p:cNvPr>
+          <p:cNvSpPr/>
+          <p:nvPr/>
+        </p:nvSpPr>
+        <p:spPr>
+          <a:xfrm>
+            <a:off x="6976267" y="2507473"/>
+            <a:ext cx="972487" cy="243939"/>
+          </a:xfrm>
+          <a:prstGeom prst="roundRect">
+            <a:avLst/>
+          </a:prstGeom>
+          <a:gradFill>
+            <a:gsLst>
+              <a:gs pos="0">
+                <a:schemeClr val="bg1"/>
+              </a:gs>
+              <a:gs pos="45000">
+                <a:schemeClr val="bg1"/>
+              </a:gs>
+              <a:gs pos="100000">
+                <a:schemeClr val="bg2"/>
+              </a:gs>
+            </a:gsLst>
+            <a:lin ang="5400000" scaled="1"/>
+          </a:gradFill>
+          <a:ln w="3175">
+            <a:solidFill>
+              <a:schemeClr val="tx1"/>
+            </a:solidFill>
+          </a:ln>
+        </p:spPr>
+        <p:style>
+          <a:lnRef idx="2">
+            <a:schemeClr val="accent1">
+              <a:shade val="15000"/>
+            </a:schemeClr>
+          </a:lnRef>
+          <a:fillRef idx="1">
+            <a:schemeClr val="accent1"/>
+          </a:fillRef>
+          <a:effectRef idx="0">
+            <a:schemeClr val="accent1"/>
+          </a:effectRef>
+          <a:fontRef idx="minor">
+            <a:schemeClr val="lt1"/>
+          </a:fontRef>
+        </p:style>
+        <p:txBody>
+          <a:bodyPr rtlCol="0" anchor="ctr"/>
+          <a:lstStyle/>
+          <a:p>
+            <a:pPr algn="ctr"/>
+            <a:r>
+              <a:rPr lang="en-US" sz="1400" dirty="0">
+                <a:solidFill>
+                  <a:schemeClr val="bg2">
+                    <a:lumMod val="25000"/>
+                  </a:schemeClr>
+                </a:solidFill>
+              </a:rPr>
+              <a:t> Example</a:t>
+            </a:r>
+          </a:p>
+        </p:txBody>
+      </p:sp>
+      <p:pic>
+        <p:nvPicPr>
+          <p:cNvPr id="51" name="Picture 50">
+            <a:extLst>
+              <a:ext uri="{FF2B5EF4-FFF2-40B4-BE49-F238E27FC236}">
+                <a16:creationId xmlns:a16="http://schemas.microsoft.com/office/drawing/2014/main" id="{C57996EA-A95B-AD14-8003-4D3FC776BC2F}"/>
+              </a:ext>
+            </a:extLst>
+          </p:cNvPr>
+          <p:cNvPicPr>
+            <a:picLocks noChangeAspect="1"/>
+          </p:cNvPicPr>
+          <p:nvPr/>
+        </p:nvPicPr>
+        <p:blipFill>
+          <a:blip r:embed="rId7"/>
+          <a:stretch>
+            <a:fillRect/>
+          </a:stretch>
+        </p:blipFill>
+        <p:spPr>
+          <a:xfrm>
+            <a:off x="11218340" y="655321"/>
+            <a:ext cx="981212" cy="905001"/>
+          </a:xfrm>
+          <a:prstGeom prst="rect">
+            <a:avLst/>
+          </a:prstGeom>
+        </p:spPr>
+      </p:pic>
+      <p:sp>
+        <p:nvSpPr>
+          <p:cNvPr id="52" name="TextBox 51">
+            <a:extLst>
+              <a:ext uri="{FF2B5EF4-FFF2-40B4-BE49-F238E27FC236}">
+                <a16:creationId xmlns:a16="http://schemas.microsoft.com/office/drawing/2014/main" id="{021E5785-5669-D54B-6BBD-D5D4CC2E8378}"/>
+              </a:ext>
+            </a:extLst>
+          </p:cNvPr>
+          <p:cNvSpPr txBox="1"/>
+          <p:nvPr/>
+        </p:nvSpPr>
+        <p:spPr>
+          <a:xfrm>
+            <a:off x="4956086" y="5037260"/>
+            <a:ext cx="2571865" cy="307777"/>
+          </a:xfrm>
+          <a:prstGeom prst="rect">
+            <a:avLst/>
+          </a:prstGeom>
+          <a:noFill/>
+        </p:spPr>
+        <p:txBody>
+          <a:bodyPr wrap="square" rtlCol="0">
+            <a:spAutoFit/>
+          </a:bodyPr>
+          <a:lstStyle/>
+          <a:p>
+            <a:pPr algn="ctr"/>
+            <a:r>
+              <a:rPr lang="en-US" sz="1400" dirty="0">
+                <a:solidFill>
+                  <a:schemeClr val="bg2">
+                    <a:lumMod val="50000"/>
+                  </a:schemeClr>
+                </a:solidFill>
+                <a:latin typeface="Georgia" panose="02040502050405020303" pitchFamily="18" charset="0"/>
+              </a:rPr>
+              <a:t>Click “Find Antiderivative.”</a:t>
+            </a:r>
+          </a:p>
+        </p:txBody>
+      </p:sp>
+      <p:sp>
+        <p:nvSpPr>
+          <p:cNvPr id="53" name="TextBox 52">
+            <a:extLst>
+              <a:ext uri="{FF2B5EF4-FFF2-40B4-BE49-F238E27FC236}">
+                <a16:creationId xmlns:a16="http://schemas.microsoft.com/office/drawing/2014/main" id="{EEAC8EC1-F78F-5974-4771-4AE7E7FCF5B3}"/>
+              </a:ext>
+            </a:extLst>
+          </p:cNvPr>
+          <p:cNvSpPr txBox="1"/>
+          <p:nvPr/>
+        </p:nvSpPr>
+        <p:spPr>
+          <a:xfrm>
+            <a:off x="1449174" y="6100898"/>
+            <a:ext cx="9271347" cy="276999"/>
+          </a:xfrm>
+          <a:prstGeom prst="rect">
+            <a:avLst/>
+          </a:prstGeom>
+          <a:noFill/>
+        </p:spPr>
+        <p:txBody>
+          <a:bodyPr wrap="square" rtlCol="0">
+            <a:spAutoFit/>
+          </a:bodyPr>
+          <a:lstStyle/>
+          <a:p>
+            <a:pPr algn="ctr"/>
+            <a:r>
+              <a:rPr lang="en-US" sz="1200" dirty="0">
+                <a:solidFill>
+                  <a:schemeClr val="bg2">
+                    <a:lumMod val="50000"/>
+                  </a:schemeClr>
+                </a:solidFill>
+                <a:latin typeface="Georgia" panose="02040502050405020303" pitchFamily="18" charset="0"/>
+              </a:rPr>
+              <a:t>Copyright © 2025 </a:t>
+            </a:r>
+            <a:r>
+              <a:rPr lang="en-US" sz="1200" u="sng" dirty="0">
+                <a:solidFill>
+                  <a:schemeClr val="bg2">
+                    <a:lumMod val="50000"/>
+                  </a:schemeClr>
+                </a:solidFill>
+                <a:latin typeface="Georgia" panose="02040502050405020303" pitchFamily="18" charset="0"/>
+              </a:rPr>
+              <a:t>Kieran Choi-Slattery</a:t>
+            </a:r>
+            <a:r>
+              <a:rPr lang="en-US" sz="1200" dirty="0">
+                <a:solidFill>
+                  <a:schemeClr val="bg2">
+                    <a:lumMod val="50000"/>
+                  </a:schemeClr>
+                </a:solidFill>
+                <a:latin typeface="Georgia" panose="02040502050405020303" pitchFamily="18" charset="0"/>
+              </a:rPr>
+              <a:t>. Largely made possible by </a:t>
+            </a:r>
+            <a:r>
+              <a:rPr lang="en-US" sz="1200" u="sng" dirty="0">
+                <a:solidFill>
+                  <a:schemeClr val="bg2">
+                    <a:lumMod val="50000"/>
+                  </a:schemeClr>
+                </a:solidFill>
+                <a:latin typeface="Georgia" panose="02040502050405020303" pitchFamily="18" charset="0"/>
+              </a:rPr>
+              <a:t>SymPy</a:t>
+            </a:r>
+            <a:r>
+              <a:rPr lang="en-US" sz="1200" dirty="0">
+                <a:solidFill>
+                  <a:schemeClr val="bg2">
+                    <a:lumMod val="50000"/>
+                  </a:schemeClr>
+                </a:solidFill>
+                <a:latin typeface="Georgia" panose="02040502050405020303" pitchFamily="18" charset="0"/>
+              </a:rPr>
+              <a:t> and </a:t>
+            </a:r>
+            <a:r>
+              <a:rPr lang="en-US" sz="1200" u="sng" dirty="0">
+                <a:solidFill>
+                  <a:schemeClr val="bg2">
+                    <a:lumMod val="50000"/>
+                  </a:schemeClr>
+                </a:solidFill>
+                <a:latin typeface="Georgia" panose="02040502050405020303" pitchFamily="18" charset="0"/>
+              </a:rPr>
+              <a:t>MathQuill</a:t>
+            </a:r>
+            <a:r>
+              <a:rPr lang="en-US" sz="1200" dirty="0">
+                <a:solidFill>
+                  <a:schemeClr val="bg2">
+                    <a:lumMod val="50000"/>
+                  </a:schemeClr>
+                </a:solidFill>
+                <a:latin typeface="Georgia" panose="02040502050405020303" pitchFamily="18" charset="0"/>
+              </a:rPr>
+              <a:t>, among others.</a:t>
+            </a:r>
+          </a:p>
+        </p:txBody>
+      </p:sp>
+      <p:sp>
+        <p:nvSpPr>
+          <p:cNvPr id="56" name="TextBox 55">
+            <a:extLst>
+              <a:ext uri="{FF2B5EF4-FFF2-40B4-BE49-F238E27FC236}">
+                <a16:creationId xmlns:a16="http://schemas.microsoft.com/office/drawing/2014/main" id="{D5F8BB0B-6EFD-2971-6539-A9E0E5948CC7}"/>
+              </a:ext>
+            </a:extLst>
+          </p:cNvPr>
+          <p:cNvSpPr txBox="1"/>
+          <p:nvPr/>
+        </p:nvSpPr>
+        <p:spPr>
+          <a:xfrm>
+            <a:off x="5144659" y="1734027"/>
+            <a:ext cx="1710572" cy="276999"/>
+          </a:xfrm>
+          <a:prstGeom prst="rect">
+            <a:avLst/>
+          </a:prstGeom>
+          <a:noFill/>
+        </p:spPr>
+        <p:txBody>
+          <a:bodyPr wrap="square" rtlCol="0">
+            <a:spAutoFit/>
+          </a:bodyPr>
+          <a:lstStyle/>
+          <a:p>
+            <a:r>
+              <a:rPr lang="en-US" sz="1200" dirty="0">
+                <a:solidFill>
+                  <a:schemeClr val="bg2">
+                    <a:lumMod val="50000"/>
+                  </a:schemeClr>
+                </a:solidFill>
+                <a:latin typeface="Georgia" panose="02040502050405020303" pitchFamily="18" charset="0"/>
+              </a:rPr>
+              <a:t>Powered by </a:t>
+            </a:r>
+            <a:r>
+              <a:rPr lang="en-US" sz="1200" dirty="0">
+                <a:solidFill>
+                  <a:srgbClr val="3B5526"/>
+                </a:solidFill>
+                <a:latin typeface="Georgia" panose="02040502050405020303" pitchFamily="18" charset="0"/>
+              </a:rPr>
+              <a:t>SymPy</a:t>
+            </a:r>
+          </a:p>
+        </p:txBody>
+      </p:sp>
+      <p:pic>
+        <p:nvPicPr>
+          <p:cNvPr id="55" name="Picture 54" descr="A green snake on a cube&#10;&#10;Description automatically generated">
+            <a:extLst>
+              <a:ext uri="{FF2B5EF4-FFF2-40B4-BE49-F238E27FC236}">
+                <a16:creationId xmlns:a16="http://schemas.microsoft.com/office/drawing/2014/main" id="{6DAFCD9E-7336-EFEA-A2AD-F37759EC5017}"/>
+              </a:ext>
+            </a:extLst>
+          </p:cNvPr>
+          <p:cNvPicPr>
+            <a:picLocks noChangeAspect="1"/>
+          </p:cNvPicPr>
+          <p:nvPr/>
+        </p:nvPicPr>
+        <p:blipFill>
+          <a:blip r:embed="rId8">
+            <a:extLst>
+              <a:ext uri="{28A0092B-C50C-407E-A947-70E740481C1C}">
+                <a14:useLocalDpi xmlns:a14="http://schemas.microsoft.com/office/drawing/2010/main" val="0"/>
+              </a:ext>
+            </a:extLst>
+          </a:blip>
+          <a:stretch>
+            <a:fillRect/>
+          </a:stretch>
+        </p:blipFill>
+        <p:spPr>
+          <a:xfrm>
+            <a:off x="6559197" y="1785005"/>
+            <a:ext cx="262812" cy="176084"/>
+          </a:xfrm>
+          <a:prstGeom prst="rect">
+            <a:avLst/>
+          </a:prstGeom>
+        </p:spPr>
+      </p:pic>
+      <p:cxnSp>
+        <p:nvCxnSpPr>
+          <p:cNvPr id="62" name="Straight Connector 61">
+            <a:extLst>
+              <a:ext uri="{FF2B5EF4-FFF2-40B4-BE49-F238E27FC236}">
+                <a16:creationId xmlns:a16="http://schemas.microsoft.com/office/drawing/2014/main" id="{3C308BE8-D1F8-47D1-5900-56F55385B35B}"/>
+              </a:ext>
+            </a:extLst>
+          </p:cNvPr>
+          <p:cNvCxnSpPr/>
+          <p:nvPr/>
+        </p:nvCxnSpPr>
+        <p:spPr>
+          <a:xfrm>
+            <a:off x="4052466" y="4383192"/>
+            <a:ext cx="4203700" cy="0"/>
+          </a:xfrm>
+          <a:prstGeom prst="line">
+            <a:avLst/>
+          </a:prstGeom>
+          <a:ln>
+            <a:solidFill>
+              <a:schemeClr val="bg2">
+                <a:lumMod val="75000"/>
+              </a:schemeClr>
+            </a:solidFill>
+          </a:ln>
+        </p:spPr>
+        <p:style>
+          <a:lnRef idx="2">
+            <a:schemeClr val="accent1"/>
+          </a:lnRef>
+          <a:fillRef idx="0">
+            <a:schemeClr val="accent1"/>
+          </a:fillRef>
+          <a:effectRef idx="1">
+            <a:schemeClr val="accent1"/>
+          </a:effectRef>
+          <a:fontRef idx="minor">
+            <a:schemeClr val="tx1"/>
+          </a:fontRef>
+        </p:style>
+      </p:cxnSp>
+      <p:cxnSp>
+        <p:nvCxnSpPr>
+          <p:cNvPr id="63" name="Straight Connector 62">
+            <a:extLst>
+              <a:ext uri="{FF2B5EF4-FFF2-40B4-BE49-F238E27FC236}">
+                <a16:creationId xmlns:a16="http://schemas.microsoft.com/office/drawing/2014/main" id="{81346C83-2965-C1C6-E821-0DB0E6F609C1}"/>
+              </a:ext>
+            </a:extLst>
+          </p:cNvPr>
+          <p:cNvCxnSpPr>
+            <a:cxnSpLocks/>
+          </p:cNvCxnSpPr>
+          <p:nvPr/>
+        </p:nvCxnSpPr>
+        <p:spPr>
+          <a:xfrm>
+            <a:off x="1443597" y="6085978"/>
+            <a:ext cx="9282502" cy="0"/>
+          </a:xfrm>
+          <a:prstGeom prst="line">
+            <a:avLst/>
+          </a:prstGeom>
+          <a:ln>
+            <a:solidFill>
+              <a:schemeClr val="bg2">
+                <a:lumMod val="75000"/>
+              </a:schemeClr>
+            </a:solidFill>
+          </a:ln>
+        </p:spPr>
+        <p:style>
+          <a:lnRef idx="2">
+            <a:schemeClr val="accent1"/>
+          </a:lnRef>
+          <a:fillRef idx="0">
+            <a:schemeClr val="accent1"/>
+          </a:fillRef>
+          <a:effectRef idx="1">
+            <a:schemeClr val="accent1"/>
+          </a:effectRef>
+          <a:fontRef idx="minor">
+            <a:schemeClr val="tx1"/>
+          </a:fontRef>
+        </p:style>
+      </p:cxnSp>
+      <p:pic>
+        <p:nvPicPr>
+          <p:cNvPr id="71" name="Picture 70">
+            <a:extLst>
+              <a:ext uri="{FF2B5EF4-FFF2-40B4-BE49-F238E27FC236}">
+                <a16:creationId xmlns:a16="http://schemas.microsoft.com/office/drawing/2014/main" id="{7308FB5E-F3C7-28C8-6CA8-77F8E54F357E}"/>
+              </a:ext>
+            </a:extLst>
+          </p:cNvPr>
+          <p:cNvPicPr>
+            <a:picLocks noChangeAspect="1"/>
+          </p:cNvPicPr>
+          <p:nvPr/>
+        </p:nvPicPr>
+        <p:blipFill rotWithShape="1">
+          <a:blip r:embed="rId9"/>
+          <a:srcRect l="1" t="13230" r="4994" b="11199"/>
+          <a:stretch/>
+        </p:blipFill>
+        <p:spPr>
+          <a:xfrm>
+            <a:off x="7403124" y="3599521"/>
+            <a:ext cx="363276" cy="281356"/>
+          </a:xfrm>
+          <a:prstGeom prst="rect">
+            <a:avLst/>
+          </a:prstGeom>
+        </p:spPr>
+      </p:pic>
+      <p:sp>
+        <p:nvSpPr>
+          <p:cNvPr id="72" name="TextBox 71">
+            <a:extLst>
+              <a:ext uri="{FF2B5EF4-FFF2-40B4-BE49-F238E27FC236}">
+                <a16:creationId xmlns:a16="http://schemas.microsoft.com/office/drawing/2014/main" id="{5DB95115-79E6-9B5E-E6F3-BE98CD84FDD7}"/>
+              </a:ext>
+            </a:extLst>
+          </p:cNvPr>
+          <p:cNvSpPr txBox="1"/>
+          <p:nvPr/>
+        </p:nvSpPr>
+        <p:spPr>
+          <a:xfrm>
+            <a:off x="4491219" y="3592649"/>
+            <a:ext cx="2911905" cy="307777"/>
+          </a:xfrm>
+          <a:prstGeom prst="rect">
+            <a:avLst/>
+          </a:prstGeom>
+          <a:noFill/>
+        </p:spPr>
+        <p:txBody>
+          <a:bodyPr wrap="square" rtlCol="0">
+            <a:spAutoFit/>
+          </a:bodyPr>
+          <a:lstStyle/>
+          <a:p>
+            <a:r>
+              <a:rPr lang="en-US" sz="1400" dirty="0">
+                <a:solidFill>
+                  <a:schemeClr val="bg2">
+                    <a:lumMod val="50000"/>
+                  </a:schemeClr>
+                </a:solidFill>
+                <a:latin typeface="Georgia" panose="02040502050405020303" pitchFamily="18" charset="0"/>
+              </a:rPr>
+              <a:t>Find antiderivative with respect to</a:t>
+            </a:r>
+          </a:p>
+        </p:txBody>
+      </p:sp>
+      <p:sp>
+        <p:nvSpPr>
+          <p:cNvPr id="3" name="Rectangle: Rounded Corners 2">
+            <a:extLst>
+              <a:ext uri="{FF2B5EF4-FFF2-40B4-BE49-F238E27FC236}">
+                <a16:creationId xmlns:a16="http://schemas.microsoft.com/office/drawing/2014/main" id="{9EB1918D-0C54-7C1A-A084-B56CE10F481D}"/>
+              </a:ext>
+            </a:extLst>
+          </p:cNvPr>
+          <p:cNvSpPr/>
+          <p:nvPr/>
+        </p:nvSpPr>
+        <p:spPr>
+          <a:xfrm>
+            <a:off x="4858543" y="2050038"/>
+            <a:ext cx="2474912" cy="218608"/>
+          </a:xfrm>
+          <a:prstGeom prst="roundRect">
+            <a:avLst/>
+          </a:prstGeom>
+          <a:solidFill>
+            <a:schemeClr val="bg1"/>
+          </a:solidFill>
+          <a:ln w="3175">
+            <a:solidFill>
+              <a:schemeClr val="tx1"/>
+            </a:solidFill>
+          </a:ln>
+        </p:spPr>
+        <p:style>
+          <a:lnRef idx="2">
+            <a:schemeClr val="accent1">
+              <a:shade val="15000"/>
+            </a:schemeClr>
+          </a:lnRef>
+          <a:fillRef idx="1">
+            <a:schemeClr val="accent1"/>
+          </a:fillRef>
+          <a:effectRef idx="0">
+            <a:schemeClr val="accent1"/>
+          </a:effectRef>
+          <a:fontRef idx="minor">
+            <a:schemeClr val="lt1"/>
+          </a:fontRef>
+        </p:style>
+        <p:txBody>
+          <a:bodyPr rtlCol="0" anchor="ctr"/>
+          <a:lstStyle/>
+          <a:p>
+            <a:pPr algn="ctr"/>
+            <a:r>
+              <a:rPr lang="en-US" sz="1400" dirty="0">
+                <a:solidFill>
+                  <a:schemeClr val="bg2">
+                    <a:lumMod val="25000"/>
+                  </a:schemeClr>
+                </a:solidFill>
+              </a:rPr>
+              <a:t>Antiderivative Calculator </a:t>
+            </a:r>
+            <a:r>
+              <a:rPr lang="en-US" sz="1400" b="1" dirty="0">
+                <a:solidFill>
+                  <a:schemeClr val="bg2">
+                    <a:lumMod val="50000"/>
+                  </a:schemeClr>
+                </a:solidFill>
+              </a:rPr>
+              <a:t>▼</a:t>
+            </a:r>
+            <a:endParaRPr lang="en-US" sz="1400" dirty="0">
+              <a:solidFill>
+                <a:schemeClr val="bg2">
+                  <a:lumMod val="50000"/>
+                </a:schemeClr>
+              </a:solidFill>
+            </a:endParaRPr>
+          </a:p>
+        </p:txBody>
+      </p:sp>
+      <p:pic>
+        <p:nvPicPr>
+          <p:cNvPr id="12" name="Picture 11" descr="\documentclass{article}&#10;\usepackage{amsmath}&#10;\usepackage{kieranlib}&#10;\pagestyle{empty}&#10;\begin{document}&#10;$$\int$$&#10;\end{document}&#10;" title="IguanaTex Bitmap Display">
+            <a:extLst>
+              <a:ext uri="{FF2B5EF4-FFF2-40B4-BE49-F238E27FC236}">
+                <a16:creationId xmlns:a16="http://schemas.microsoft.com/office/drawing/2014/main" id="{1D9FCD81-9543-1817-33B5-4621B87BB642}"/>
+              </a:ext>
+            </a:extLst>
+          </p:cNvPr>
+          <p:cNvPicPr>
+            <a:picLocks noChangeAspect="1"/>
+          </p:cNvPicPr>
+          <p:nvPr>
+            <p:custDataLst>
+              <p:tags r:id="rId1"/>
+            </p:custDataLst>
+          </p:nvPr>
+        </p:nvPicPr>
+        <p:blipFill>
+          <a:blip r:embed="rId10">
+            <a:extLst>
+              <a:ext uri="{28A0092B-C50C-407E-A947-70E740481C1C}">
+                <a14:useLocalDpi xmlns:a14="http://schemas.microsoft.com/office/drawing/2010/main" val="0"/>
+              </a:ext>
+            </a:extLst>
+          </a:blip>
+          <a:stretch>
+            <a:fillRect/>
+          </a:stretch>
+        </p:blipFill>
+        <p:spPr>
+          <a:xfrm>
+            <a:off x="4348336" y="2795154"/>
+            <a:ext cx="289524" cy="706667"/>
+          </a:xfrm>
+          <a:prstGeom prst="rect">
+            <a:avLst/>
+          </a:prstGeom>
+        </p:spPr>
+      </p:pic>
+      <p:pic>
+        <p:nvPicPr>
+          <p:cNvPr id="17" name="Picture 16" descr="\documentclass{article}&#10;\usepackage{amsmath}&#10;\usepackage{kieranlib}&#10;\pagestyle{empty}&#10;\begin{document}&#10;$$dx$$&#10;\end{document}&#10;" title="IguanaTex Bitmap Display">
+            <a:extLst>
+              <a:ext uri="{FF2B5EF4-FFF2-40B4-BE49-F238E27FC236}">
+                <a16:creationId xmlns:a16="http://schemas.microsoft.com/office/drawing/2014/main" id="{B16F1116-A3F7-7293-A5A9-3234ED8B3D15}"/>
+              </a:ext>
+            </a:extLst>
+          </p:cNvPr>
+          <p:cNvPicPr>
+            <a:picLocks noChangeAspect="1"/>
+          </p:cNvPicPr>
+          <p:nvPr>
+            <p:custDataLst>
+              <p:tags r:id="rId2"/>
+            </p:custDataLst>
+          </p:nvPr>
+        </p:nvPicPr>
+        <p:blipFill>
+          <a:blip r:embed="rId11">
+            <a:extLst>
+              <a:ext uri="{28A0092B-C50C-407E-A947-70E740481C1C}">
+                <a14:useLocalDpi xmlns:a14="http://schemas.microsoft.com/office/drawing/2010/main" val="0"/>
+              </a:ext>
+            </a:extLst>
+          </a:blip>
+          <a:stretch>
+            <a:fillRect/>
+          </a:stretch>
+        </p:blipFill>
+        <p:spPr>
+          <a:xfrm>
+            <a:off x="7555219" y="2976929"/>
+            <a:ext cx="384000" cy="267429"/>
+          </a:xfrm>
+          <a:prstGeom prst="rect">
+            <a:avLst/>
+          </a:prstGeom>
+        </p:spPr>
+      </p:pic>
+    </p:spTree>
+    <p:extLst>
+      <p:ext uri="{BB962C8B-B14F-4D97-AF65-F5344CB8AC3E}">
+        <p14:creationId xmlns:p14="http://schemas.microsoft.com/office/powerpoint/2010/main" val="3613166647"/>
+      </p:ext>
+    </p:extLst>
+  </p:cSld>
+  <p:clrMapOvr>
+    <a:masterClrMapping/>
+  </p:clrMapOvr>
+</p:sld>
+</file>
+
+<file path=ppt/tags/tag1.xml><?xml version="1.0" encoding="utf-8"?>
+<p:tagLst xmlns:a="http://schemas.openxmlformats.org/drawingml/2006/main" xmlns:r="http://schemas.openxmlformats.org/officeDocument/2006/relationships" xmlns:p="http://schemas.openxmlformats.org/presentationml/2006/main">
+  <p:tag name="OUTPUTDPI" val="1200"/>
+  <p:tag name="ORIGINALHEIGHT" val="278.2152"/>
+  <p:tag name="ORIGINALWIDTH" val="113.9857"/>
+  <p:tag name="OUTPUTTYPE" val="PNG"/>
+  <p:tag name="IGUANATEXVERSION" val="160"/>
+  <p:tag name="LATEXADDIN" val="\documentclass{article}&#10;\usepackage{amsmath}&#10;\usepackage{kieranlib}&#10;\pagestyle{empty}&#10;\begin{document}&#10;$$\int$$&#10;\end{document}&#10;"/>
+  <p:tag name="IGUANATEXSIZE" val="25"/>
+  <p:tag name="IGUANATEXCURSOR" val="111"/>
+  <p:tag name="TRANSPARENCY" val="True"/>
+  <p:tag name="LATEXENGINEID" val="0"/>
+  <p:tag name="TEMPFOLDER" val="c:\temp\"/>
+  <p:tag name="LATEXFORMHEIGHT" val="320"/>
+  <p:tag name="LATEXFORMWIDTH" val="385"/>
+  <p:tag name="LATEXFORMWRAP" val="True"/>
+  <p:tag name="BITMAPVECTOR" val="0"/>
+</p:tagLst>
+</file>
+
+<file path=ppt/tags/tag2.xml><?xml version="1.0" encoding="utf-8"?>
+<p:tagLst xmlns:a="http://schemas.openxmlformats.org/drawingml/2006/main" xmlns:r="http://schemas.openxmlformats.org/officeDocument/2006/relationships" xmlns:p="http://schemas.openxmlformats.org/presentationml/2006/main">
+  <p:tag name="OUTPUTDPI" val="1200"/>
+  <p:tag name="ORIGINALHEIGHT" val="87.73905"/>
+  <p:tag name="ORIGINALWIDTH" val="125.9843"/>
+  <p:tag name="OUTPUTTYPE" val="PNG"/>
+  <p:tag name="IGUANATEXVERSION" val="160"/>
+  <p:tag name="LATEXADDIN" val="\documentclass{article}&#10;\usepackage{amsmath}&#10;\usepackage{kieranlib}&#10;\pagestyle{empty}&#10;\begin{document}&#10;$$dx$$&#10;\end{document}&#10;"/>
+  <p:tag name="IGUANATEXSIZE" val="30"/>
+  <p:tag name="IGUANATEXCURSOR" val="107"/>
+  <p:tag name="TRANSPARENCY" val="True"/>
+  <p:tag name="LATEXENGINEID" val="0"/>
+  <p:tag name="TEMPFOLDER" val="c:\temp\"/>
+  <p:tag name="LATEXFORMHEIGHT" val="320"/>
+  <p:tag name="LATEXFORMWIDTH" val="385"/>
+  <p:tag name="LATEXFORMWRAP" val="True"/>
+  <p:tag name="BITMAPVECTOR" val="0"/>
+</p:tagLst>
 </file>
 
 <file path=ppt/theme/theme1.xml><?xml version="1.0" encoding="utf-8"?>

</xml_diff>